<commit_message>
Added line to slideshow
</commit_message>
<xml_diff>
--- a/SWE_632_Tech_Talk__PureCSS.pptx
+++ b/SWE_632_Tech_Talk__PureCSS.pptx
@@ -220,7 +220,7 @@
           <a:p>
             <a:fld id="{1F3CD97B-9297-474E-B3F1-AAEE98B265C2}" type="datetimeFigureOut">
               <a:rPr lang="en-US" smtClean="0"/>
-              <a:t>3/19/18</a:t>
+              <a:t>3/20/18</a:t>
             </a:fld>
             <a:endParaRPr lang="en-US"/>
           </a:p>
@@ -810,7 +810,7 @@
             <a:fld id="{5C2F51AC-1738-2043-BD99-BD04DC72ED2F}" type="datetimeFigureOut">
               <a:rPr lang="en-US" smtClean="0"/>
               <a:pPr/>
-              <a:t>3/19/18</a:t>
+              <a:t>3/20/18</a:t>
             </a:fld>
             <a:endParaRPr lang="en-US"/>
           </a:p>
@@ -1028,7 +1028,7 @@
             <a:fld id="{5C2F51AC-1738-2043-BD99-BD04DC72ED2F}" type="datetimeFigureOut">
               <a:rPr lang="en-US" smtClean="0"/>
               <a:pPr/>
-              <a:t>3/19/18</a:t>
+              <a:t>3/20/18</a:t>
             </a:fld>
             <a:endParaRPr lang="en-US"/>
           </a:p>
@@ -1301,7 +1301,7 @@
             <a:fld id="{5C2F51AC-1738-2043-BD99-BD04DC72ED2F}" type="datetimeFigureOut">
               <a:rPr lang="en-US" smtClean="0"/>
               <a:pPr/>
-              <a:t>3/19/18</a:t>
+              <a:t>3/20/18</a:t>
             </a:fld>
             <a:endParaRPr lang="en-US"/>
           </a:p>
@@ -1477,7 +1477,7 @@
             <a:fld id="{5C2F51AC-1738-2043-BD99-BD04DC72ED2F}" type="datetimeFigureOut">
               <a:rPr lang="en-US" smtClean="0"/>
               <a:pPr/>
-              <a:t>3/19/18</a:t>
+              <a:t>3/20/18</a:t>
             </a:fld>
             <a:endParaRPr lang="en-US"/>
           </a:p>
@@ -1832,7 +1832,7 @@
             <a:fld id="{5C2F51AC-1738-2043-BD99-BD04DC72ED2F}" type="datetimeFigureOut">
               <a:rPr lang="en-US" smtClean="0"/>
               <a:pPr/>
-              <a:t>3/19/18</a:t>
+              <a:t>3/20/18</a:t>
             </a:fld>
             <a:endParaRPr lang="en-US"/>
           </a:p>
@@ -2118,7 +2118,7 @@
             <a:fld id="{5C2F51AC-1738-2043-BD99-BD04DC72ED2F}" type="datetimeFigureOut">
               <a:rPr lang="en-US" smtClean="0"/>
               <a:pPr/>
-              <a:t>3/19/18</a:t>
+              <a:t>3/20/18</a:t>
             </a:fld>
             <a:endParaRPr lang="en-US"/>
           </a:p>
@@ -2541,7 +2541,7 @@
             <a:fld id="{5C2F51AC-1738-2043-BD99-BD04DC72ED2F}" type="datetimeFigureOut">
               <a:rPr lang="en-US" smtClean="0"/>
               <a:pPr/>
-              <a:t>3/19/18</a:t>
+              <a:t>3/20/18</a:t>
             </a:fld>
             <a:endParaRPr lang="en-US"/>
           </a:p>
@@ -2655,7 +2655,7 @@
             <a:fld id="{5C2F51AC-1738-2043-BD99-BD04DC72ED2F}" type="datetimeFigureOut">
               <a:rPr lang="en-US" smtClean="0"/>
               <a:pPr/>
-              <a:t>3/19/18</a:t>
+              <a:t>3/20/18</a:t>
             </a:fld>
             <a:endParaRPr lang="en-US"/>
           </a:p>
@@ -2747,7 +2747,7 @@
             <a:fld id="{5C2F51AC-1738-2043-BD99-BD04DC72ED2F}" type="datetimeFigureOut">
               <a:rPr lang="en-US" smtClean="0"/>
               <a:pPr/>
-              <a:t>3/19/18</a:t>
+              <a:t>3/20/18</a:t>
             </a:fld>
             <a:endParaRPr lang="en-US"/>
           </a:p>
@@ -3026,7 +3026,7 @@
             <a:fld id="{5C2F51AC-1738-2043-BD99-BD04DC72ED2F}" type="datetimeFigureOut">
               <a:rPr lang="en-US" smtClean="0"/>
               <a:pPr/>
-              <a:t>3/19/18</a:t>
+              <a:t>3/20/18</a:t>
             </a:fld>
             <a:endParaRPr lang="en-US"/>
           </a:p>
@@ -3389,7 +3389,7 @@
             <a:fld id="{5C2F51AC-1738-2043-BD99-BD04DC72ED2F}" type="datetimeFigureOut">
               <a:rPr lang="en-US" smtClean="0"/>
               <a:pPr/>
-              <a:t>3/19/18</a:t>
+              <a:t>3/20/18</a:t>
             </a:fld>
             <a:endParaRPr lang="en-US"/>
           </a:p>
@@ -3814,7 +3814,7 @@
             <a:fld id="{5C2F51AC-1738-2043-BD99-BD04DC72ED2F}" type="datetimeFigureOut">
               <a:rPr lang="en-US" smtClean="0"/>
               <a:pPr/>
-              <a:t>3/19/18</a:t>
+              <a:t>3/20/18</a:t>
             </a:fld>
             <a:endParaRPr lang="en-US"/>
           </a:p>
@@ -5638,6 +5638,49 @@
           </a:ln>
         </p:spPr>
       </p:pic>
+      <p:sp>
+        <p:nvSpPr>
+          <p:cNvPr id="8" name="Rectangle 7">
+            <a:extLst>
+              <a:ext uri="{FF2B5EF4-FFF2-40B4-BE49-F238E27FC236}">
+                <a16:creationId xmlns:a16="http://schemas.microsoft.com/office/drawing/2014/main" id="{C5E4D9F5-3620-4344-B87B-363C02E4509A}"/>
+              </a:ext>
+            </a:extLst>
+          </p:cNvPr>
+          <p:cNvSpPr/>
+          <p:nvPr/>
+        </p:nvSpPr>
+        <p:spPr>
+          <a:xfrm>
+            <a:off x="4829975" y="6488668"/>
+            <a:ext cx="7383817" cy="369332"/>
+          </a:xfrm>
+          <a:prstGeom prst="rect">
+            <a:avLst/>
+          </a:prstGeom>
+        </p:spPr>
+        <p:txBody>
+          <a:bodyPr wrap="none">
+            <a:spAutoFit/>
+          </a:bodyPr>
+          <a:lstStyle/>
+          <a:p>
+            <a:pPr algn="ctr"/>
+            <a:r>
+              <a:rPr lang="en-US" i="1" dirty="0"/>
+              <a:t>*compiled by analyzing framework files, documentation, and </a:t>
+            </a:r>
+            <a:r>
+              <a:rPr lang="en-US" i="1" dirty="0" err="1"/>
+              <a:t>GitHub</a:t>
+            </a:r>
+            <a:r>
+              <a:rPr lang="en-US" i="1" dirty="0"/>
+              <a:t> statistics</a:t>
+            </a:r>
+          </a:p>
+        </p:txBody>
+      </p:sp>
     </p:spTree>
     <p:extLst>
       <p:ext uri="{BB962C8B-B14F-4D97-AF65-F5344CB8AC3E}">

</xml_diff>